<commit_message>
update Data Flow Powerpoint
</commit_message>
<xml_diff>
--- a/img/src/Data Flow.pptx
+++ b/img/src/Data Flow.pptx
@@ -5630,8 +5630,8 @@
         </p:nvSpPr>
         <p:spPr>
           <a:xfrm flipV="1">
-            <a:off x="2894330" y="2590799"/>
-            <a:ext cx="387140" cy="1066799"/>
+            <a:off x="2859404" y="2590800"/>
+            <a:ext cx="421430" cy="1066799"/>
           </a:xfrm>
           <a:custGeom>
             <a:avLst/>
@@ -6364,6 +6364,176 @@
               <a:gd name="connsiteY3" fmla="*/ 182878 h 1066799"/>
               <a:gd name="connsiteX4" fmla="*/ 306071 w 387140"/>
               <a:gd name="connsiteY4" fmla="*/ 0 h 1066799"/>
+              <a:gd name="connsiteX0" fmla="*/ 382272 w 387140"/>
+              <a:gd name="connsiteY0" fmla="*/ 1066799 h 1066799"/>
+              <a:gd name="connsiteX1" fmla="*/ 229870 w 387140"/>
+              <a:gd name="connsiteY1" fmla="*/ 838198 h 1066799"/>
+              <a:gd name="connsiteX2" fmla="*/ 1270 w 387140"/>
+              <a:gd name="connsiteY2" fmla="*/ 457198 h 1066799"/>
+              <a:gd name="connsiteX3" fmla="*/ 264160 w 387140"/>
+              <a:gd name="connsiteY3" fmla="*/ 182878 h 1066799"/>
+              <a:gd name="connsiteX4" fmla="*/ 306071 w 387140"/>
+              <a:gd name="connsiteY4" fmla="*/ 0 h 1066799"/>
+              <a:gd name="connsiteX0" fmla="*/ 382272 w 387140"/>
+              <a:gd name="connsiteY0" fmla="*/ 1066799 h 1066799"/>
+              <a:gd name="connsiteX1" fmla="*/ 237490 w 387140"/>
+              <a:gd name="connsiteY1" fmla="*/ 822958 h 1066799"/>
+              <a:gd name="connsiteX2" fmla="*/ 1270 w 387140"/>
+              <a:gd name="connsiteY2" fmla="*/ 457198 h 1066799"/>
+              <a:gd name="connsiteX3" fmla="*/ 264160 w 387140"/>
+              <a:gd name="connsiteY3" fmla="*/ 182878 h 1066799"/>
+              <a:gd name="connsiteX4" fmla="*/ 306071 w 387140"/>
+              <a:gd name="connsiteY4" fmla="*/ 0 h 1066799"/>
+              <a:gd name="connsiteX0" fmla="*/ 382272 w 385235"/>
+              <a:gd name="connsiteY0" fmla="*/ 1066799 h 1066799"/>
+              <a:gd name="connsiteX1" fmla="*/ 237490 w 385235"/>
+              <a:gd name="connsiteY1" fmla="*/ 822958 h 1066799"/>
+              <a:gd name="connsiteX2" fmla="*/ 1270 w 385235"/>
+              <a:gd name="connsiteY2" fmla="*/ 457198 h 1066799"/>
+              <a:gd name="connsiteX3" fmla="*/ 264160 w 385235"/>
+              <a:gd name="connsiteY3" fmla="*/ 182878 h 1066799"/>
+              <a:gd name="connsiteX4" fmla="*/ 306071 w 385235"/>
+              <a:gd name="connsiteY4" fmla="*/ 0 h 1066799"/>
+              <a:gd name="connsiteX0" fmla="*/ 380367 w 383330"/>
+              <a:gd name="connsiteY0" fmla="*/ 1066799 h 1066799"/>
+              <a:gd name="connsiteX1" fmla="*/ 235585 w 383330"/>
+              <a:gd name="connsiteY1" fmla="*/ 822958 h 1066799"/>
+              <a:gd name="connsiteX2" fmla="*/ 1270 w 383330"/>
+              <a:gd name="connsiteY2" fmla="*/ 508633 h 1066799"/>
+              <a:gd name="connsiteX3" fmla="*/ 262255 w 383330"/>
+              <a:gd name="connsiteY3" fmla="*/ 182878 h 1066799"/>
+              <a:gd name="connsiteX4" fmla="*/ 304166 w 383330"/>
+              <a:gd name="connsiteY4" fmla="*/ 0 h 1066799"/>
+              <a:gd name="connsiteX0" fmla="*/ 380367 w 383330"/>
+              <a:gd name="connsiteY0" fmla="*/ 1066799 h 1066799"/>
+              <a:gd name="connsiteX1" fmla="*/ 235585 w 383330"/>
+              <a:gd name="connsiteY1" fmla="*/ 822958 h 1066799"/>
+              <a:gd name="connsiteX2" fmla="*/ 1270 w 383330"/>
+              <a:gd name="connsiteY2" fmla="*/ 508633 h 1066799"/>
+              <a:gd name="connsiteX3" fmla="*/ 208915 w 383330"/>
+              <a:gd name="connsiteY3" fmla="*/ 234313 h 1066799"/>
+              <a:gd name="connsiteX4" fmla="*/ 304166 w 383330"/>
+              <a:gd name="connsiteY4" fmla="*/ 0 h 1066799"/>
+              <a:gd name="connsiteX0" fmla="*/ 380367 w 383330"/>
+              <a:gd name="connsiteY0" fmla="*/ 1066799 h 1066799"/>
+              <a:gd name="connsiteX1" fmla="*/ 235585 w 383330"/>
+              <a:gd name="connsiteY1" fmla="*/ 822958 h 1066799"/>
+              <a:gd name="connsiteX2" fmla="*/ 1270 w 383330"/>
+              <a:gd name="connsiteY2" fmla="*/ 508633 h 1066799"/>
+              <a:gd name="connsiteX3" fmla="*/ 222250 w 383330"/>
+              <a:gd name="connsiteY3" fmla="*/ 200023 h 1066799"/>
+              <a:gd name="connsiteX4" fmla="*/ 304166 w 383330"/>
+              <a:gd name="connsiteY4" fmla="*/ 0 h 1066799"/>
+              <a:gd name="connsiteX0" fmla="*/ 380367 w 383330"/>
+              <a:gd name="connsiteY0" fmla="*/ 1066799 h 1066799"/>
+              <a:gd name="connsiteX1" fmla="*/ 235585 w 383330"/>
+              <a:gd name="connsiteY1" fmla="*/ 822958 h 1066799"/>
+              <a:gd name="connsiteX2" fmla="*/ 1270 w 383330"/>
+              <a:gd name="connsiteY2" fmla="*/ 508633 h 1066799"/>
+              <a:gd name="connsiteX3" fmla="*/ 222250 w 383330"/>
+              <a:gd name="connsiteY3" fmla="*/ 200023 h 1066799"/>
+              <a:gd name="connsiteX4" fmla="*/ 304166 w 383330"/>
+              <a:gd name="connsiteY4" fmla="*/ 0 h 1066799"/>
+              <a:gd name="connsiteX0" fmla="*/ 380367 w 383330"/>
+              <a:gd name="connsiteY0" fmla="*/ 1066799 h 1066799"/>
+              <a:gd name="connsiteX1" fmla="*/ 235585 w 383330"/>
+              <a:gd name="connsiteY1" fmla="*/ 822958 h 1066799"/>
+              <a:gd name="connsiteX2" fmla="*/ 1270 w 383330"/>
+              <a:gd name="connsiteY2" fmla="*/ 508633 h 1066799"/>
+              <a:gd name="connsiteX3" fmla="*/ 222250 w 383330"/>
+              <a:gd name="connsiteY3" fmla="*/ 200023 h 1066799"/>
+              <a:gd name="connsiteX4" fmla="*/ 304166 w 383330"/>
+              <a:gd name="connsiteY4" fmla="*/ 0 h 1066799"/>
+              <a:gd name="connsiteX0" fmla="*/ 382272 w 385235"/>
+              <a:gd name="connsiteY0" fmla="*/ 1066799 h 1066799"/>
+              <a:gd name="connsiteX1" fmla="*/ 237490 w 385235"/>
+              <a:gd name="connsiteY1" fmla="*/ 822958 h 1066799"/>
+              <a:gd name="connsiteX2" fmla="*/ 3175 w 385235"/>
+              <a:gd name="connsiteY2" fmla="*/ 508633 h 1066799"/>
+              <a:gd name="connsiteX3" fmla="*/ 224155 w 385235"/>
+              <a:gd name="connsiteY3" fmla="*/ 200023 h 1066799"/>
+              <a:gd name="connsiteX4" fmla="*/ 306071 w 385235"/>
+              <a:gd name="connsiteY4" fmla="*/ 0 h 1066799"/>
+              <a:gd name="connsiteX0" fmla="*/ 418467 w 421430"/>
+              <a:gd name="connsiteY0" fmla="*/ 1066799 h 1066799"/>
+              <a:gd name="connsiteX1" fmla="*/ 273685 w 421430"/>
+              <a:gd name="connsiteY1" fmla="*/ 822958 h 1066799"/>
+              <a:gd name="connsiteX2" fmla="*/ 3175 w 421430"/>
+              <a:gd name="connsiteY2" fmla="*/ 495298 h 1066799"/>
+              <a:gd name="connsiteX3" fmla="*/ 260350 w 421430"/>
+              <a:gd name="connsiteY3" fmla="*/ 200023 h 1066799"/>
+              <a:gd name="connsiteX4" fmla="*/ 342266 w 421430"/>
+              <a:gd name="connsiteY4" fmla="*/ 0 h 1066799"/>
+              <a:gd name="connsiteX0" fmla="*/ 418467 w 421430"/>
+              <a:gd name="connsiteY0" fmla="*/ 1066799 h 1066799"/>
+              <a:gd name="connsiteX1" fmla="*/ 273685 w 421430"/>
+              <a:gd name="connsiteY1" fmla="*/ 822958 h 1066799"/>
+              <a:gd name="connsiteX2" fmla="*/ 3175 w 421430"/>
+              <a:gd name="connsiteY2" fmla="*/ 495298 h 1066799"/>
+              <a:gd name="connsiteX3" fmla="*/ 260350 w 421430"/>
+              <a:gd name="connsiteY3" fmla="*/ 200023 h 1066799"/>
+              <a:gd name="connsiteX4" fmla="*/ 342266 w 421430"/>
+              <a:gd name="connsiteY4" fmla="*/ 0 h 1066799"/>
+              <a:gd name="connsiteX0" fmla="*/ 418467 w 421430"/>
+              <a:gd name="connsiteY0" fmla="*/ 1066799 h 1066799"/>
+              <a:gd name="connsiteX1" fmla="*/ 273685 w 421430"/>
+              <a:gd name="connsiteY1" fmla="*/ 822958 h 1066799"/>
+              <a:gd name="connsiteX2" fmla="*/ 3175 w 421430"/>
+              <a:gd name="connsiteY2" fmla="*/ 495298 h 1066799"/>
+              <a:gd name="connsiteX3" fmla="*/ 260350 w 421430"/>
+              <a:gd name="connsiteY3" fmla="*/ 200023 h 1066799"/>
+              <a:gd name="connsiteX4" fmla="*/ 342266 w 421430"/>
+              <a:gd name="connsiteY4" fmla="*/ 0 h 1066799"/>
+              <a:gd name="connsiteX0" fmla="*/ 418467 w 421430"/>
+              <a:gd name="connsiteY0" fmla="*/ 1066799 h 1066799"/>
+              <a:gd name="connsiteX1" fmla="*/ 273685 w 421430"/>
+              <a:gd name="connsiteY1" fmla="*/ 822958 h 1066799"/>
+              <a:gd name="connsiteX2" fmla="*/ 3175 w 421430"/>
+              <a:gd name="connsiteY2" fmla="*/ 495298 h 1066799"/>
+              <a:gd name="connsiteX3" fmla="*/ 260350 w 421430"/>
+              <a:gd name="connsiteY3" fmla="*/ 200023 h 1066799"/>
+              <a:gd name="connsiteX4" fmla="*/ 342266 w 421430"/>
+              <a:gd name="connsiteY4" fmla="*/ 0 h 1066799"/>
+              <a:gd name="connsiteX0" fmla="*/ 418467 w 421430"/>
+              <a:gd name="connsiteY0" fmla="*/ 1066799 h 1066799"/>
+              <a:gd name="connsiteX1" fmla="*/ 273685 w 421430"/>
+              <a:gd name="connsiteY1" fmla="*/ 822958 h 1066799"/>
+              <a:gd name="connsiteX2" fmla="*/ 3175 w 421430"/>
+              <a:gd name="connsiteY2" fmla="*/ 495298 h 1066799"/>
+              <a:gd name="connsiteX3" fmla="*/ 260350 w 421430"/>
+              <a:gd name="connsiteY3" fmla="*/ 200023 h 1066799"/>
+              <a:gd name="connsiteX4" fmla="*/ 342266 w 421430"/>
+              <a:gd name="connsiteY4" fmla="*/ 0 h 1066799"/>
+              <a:gd name="connsiteX0" fmla="*/ 418467 w 421430"/>
+              <a:gd name="connsiteY0" fmla="*/ 1066799 h 1066799"/>
+              <a:gd name="connsiteX1" fmla="*/ 273685 w 421430"/>
+              <a:gd name="connsiteY1" fmla="*/ 822958 h 1066799"/>
+              <a:gd name="connsiteX2" fmla="*/ 3175 w 421430"/>
+              <a:gd name="connsiteY2" fmla="*/ 495298 h 1066799"/>
+              <a:gd name="connsiteX3" fmla="*/ 260350 w 421430"/>
+              <a:gd name="connsiteY3" fmla="*/ 200023 h 1066799"/>
+              <a:gd name="connsiteX4" fmla="*/ 342266 w 421430"/>
+              <a:gd name="connsiteY4" fmla="*/ 0 h 1066799"/>
+              <a:gd name="connsiteX0" fmla="*/ 418467 w 421430"/>
+              <a:gd name="connsiteY0" fmla="*/ 1066799 h 1066799"/>
+              <a:gd name="connsiteX1" fmla="*/ 273685 w 421430"/>
+              <a:gd name="connsiteY1" fmla="*/ 822958 h 1066799"/>
+              <a:gd name="connsiteX2" fmla="*/ 3175 w 421430"/>
+              <a:gd name="connsiteY2" fmla="*/ 495298 h 1066799"/>
+              <a:gd name="connsiteX3" fmla="*/ 260350 w 421430"/>
+              <a:gd name="connsiteY3" fmla="*/ 200023 h 1066799"/>
+              <a:gd name="connsiteX4" fmla="*/ 342266 w 421430"/>
+              <a:gd name="connsiteY4" fmla="*/ 0 h 1066799"/>
+              <a:gd name="connsiteX0" fmla="*/ 418467 w 421430"/>
+              <a:gd name="connsiteY0" fmla="*/ 1066799 h 1066799"/>
+              <a:gd name="connsiteX1" fmla="*/ 273685 w 421430"/>
+              <a:gd name="connsiteY1" fmla="*/ 822958 h 1066799"/>
+              <a:gd name="connsiteX2" fmla="*/ 3175 w 421430"/>
+              <a:gd name="connsiteY2" fmla="*/ 495298 h 1066799"/>
+              <a:gd name="connsiteX3" fmla="*/ 260350 w 421430"/>
+              <a:gd name="connsiteY3" fmla="*/ 200023 h 1066799"/>
+              <a:gd name="connsiteX4" fmla="*/ 342266 w 421430"/>
+              <a:gd name="connsiteY4" fmla="*/ 0 h 1066799"/>
             </a:gdLst>
             <a:ahLst/>
             <a:cxnLst>
@@ -6385,29 +6555,29 @@
             </a:cxnLst>
             <a:rect l="l" t="t" r="r" b="b"/>
             <a:pathLst>
-              <a:path w="387140" h="1066799">
+              <a:path w="421430" h="1066799">
                 <a:moveTo>
-                  <a:pt x="382272" y="1066799"/>
+                  <a:pt x="418467" y="1066799"/>
                 </a:moveTo>
                 <a:cubicBezTo>
-                  <a:pt x="387140" y="861906"/>
-                  <a:pt x="368315" y="800123"/>
-                  <a:pt x="256540" y="773428"/>
+                  <a:pt x="421430" y="829521"/>
+                  <a:pt x="385460" y="849653"/>
+                  <a:pt x="273685" y="822958"/>
                 </a:cubicBezTo>
                 <a:cubicBezTo>
-                  <a:pt x="100965" y="721040"/>
-                  <a:pt x="0" y="656588"/>
-                  <a:pt x="1270" y="457198"/>
+                  <a:pt x="118110" y="770570"/>
+                  <a:pt x="0" y="652778"/>
+                  <a:pt x="3175" y="495298"/>
                 </a:cubicBezTo>
                 <a:cubicBezTo>
-                  <a:pt x="4445" y="299718"/>
-                  <a:pt x="213360" y="259078"/>
-                  <a:pt x="264160" y="182878"/>
+                  <a:pt x="23495" y="248283"/>
+                  <a:pt x="190500" y="252093"/>
+                  <a:pt x="260350" y="200023"/>
                 </a:cubicBezTo>
                 <a:cubicBezTo>
-                  <a:pt x="314960" y="106678"/>
-                  <a:pt x="306329" y="110616"/>
-                  <a:pt x="306071" y="0"/>
+                  <a:pt x="330200" y="147953"/>
+                  <a:pt x="342524" y="110616"/>
+                  <a:pt x="342266" y="0"/>
                 </a:cubicBezTo>
               </a:path>
             </a:pathLst>

</xml_diff>